<commit_message>
[Add] Studying and practicing JOIN
</commit_message>
<xml_diff>
--- a/Practice/db-practice_06.pptx
+++ b/Practice/db-practice_06.pptx
@@ -12,6 +12,10 @@
     <p:sldId id="260" r:id="rId6"/>
     <p:sldId id="261" r:id="rId7"/>
     <p:sldId id="262" r:id="rId8"/>
+    <p:sldId id="263" r:id="rId9"/>
+    <p:sldId id="264" r:id="rId10"/>
+    <p:sldId id="265" r:id="rId11"/>
+    <p:sldId id="266" r:id="rId12"/>
   </p:sldIdLst>
   <p:sldSz cx="12192000" cy="6858000"/>
   <p:notesSz cx="6858000" cy="9144000"/>
@@ -265,7 +269,7 @@
           <a:p>
             <a:fld id="{9E8C257C-B0BF-4458-BCB4-AD4358D12A42}" type="datetimeFigureOut">
               <a:rPr lang="ko-KR" altLang="en-US" smtClean="0"/>
-              <a:t>2025-04-01</a:t>
+              <a:t>2025-04-02</a:t>
             </a:fld>
             <a:endParaRPr lang="ko-KR" altLang="en-US"/>
           </a:p>
@@ -463,7 +467,7 @@
           <a:p>
             <a:fld id="{9E8C257C-B0BF-4458-BCB4-AD4358D12A42}" type="datetimeFigureOut">
               <a:rPr lang="ko-KR" altLang="en-US" smtClean="0"/>
-              <a:t>2025-04-01</a:t>
+              <a:t>2025-04-02</a:t>
             </a:fld>
             <a:endParaRPr lang="ko-KR" altLang="en-US"/>
           </a:p>
@@ -671,7 +675,7 @@
           <a:p>
             <a:fld id="{9E8C257C-B0BF-4458-BCB4-AD4358D12A42}" type="datetimeFigureOut">
               <a:rPr lang="ko-KR" altLang="en-US" smtClean="0"/>
-              <a:t>2025-04-01</a:t>
+              <a:t>2025-04-02</a:t>
             </a:fld>
             <a:endParaRPr lang="ko-KR" altLang="en-US"/>
           </a:p>
@@ -869,7 +873,7 @@
           <a:p>
             <a:fld id="{9E8C257C-B0BF-4458-BCB4-AD4358D12A42}" type="datetimeFigureOut">
               <a:rPr lang="ko-KR" altLang="en-US" smtClean="0"/>
-              <a:t>2025-04-01</a:t>
+              <a:t>2025-04-02</a:t>
             </a:fld>
             <a:endParaRPr lang="ko-KR" altLang="en-US"/>
           </a:p>
@@ -1144,7 +1148,7 @@
           <a:p>
             <a:fld id="{9E8C257C-B0BF-4458-BCB4-AD4358D12A42}" type="datetimeFigureOut">
               <a:rPr lang="ko-KR" altLang="en-US" smtClean="0"/>
-              <a:t>2025-04-01</a:t>
+              <a:t>2025-04-02</a:t>
             </a:fld>
             <a:endParaRPr lang="ko-KR" altLang="en-US"/>
           </a:p>
@@ -1409,7 +1413,7 @@
           <a:p>
             <a:fld id="{9E8C257C-B0BF-4458-BCB4-AD4358D12A42}" type="datetimeFigureOut">
               <a:rPr lang="ko-KR" altLang="en-US" smtClean="0"/>
-              <a:t>2025-04-01</a:t>
+              <a:t>2025-04-02</a:t>
             </a:fld>
             <a:endParaRPr lang="ko-KR" altLang="en-US"/>
           </a:p>
@@ -1821,7 +1825,7 @@
           <a:p>
             <a:fld id="{9E8C257C-B0BF-4458-BCB4-AD4358D12A42}" type="datetimeFigureOut">
               <a:rPr lang="ko-KR" altLang="en-US" smtClean="0"/>
-              <a:t>2025-04-01</a:t>
+              <a:t>2025-04-02</a:t>
             </a:fld>
             <a:endParaRPr lang="ko-KR" altLang="en-US"/>
           </a:p>
@@ -1962,7 +1966,7 @@
           <a:p>
             <a:fld id="{9E8C257C-B0BF-4458-BCB4-AD4358D12A42}" type="datetimeFigureOut">
               <a:rPr lang="ko-KR" altLang="en-US" smtClean="0"/>
-              <a:t>2025-04-01</a:t>
+              <a:t>2025-04-02</a:t>
             </a:fld>
             <a:endParaRPr lang="ko-KR" altLang="en-US"/>
           </a:p>
@@ -2075,7 +2079,7 @@
           <a:p>
             <a:fld id="{9E8C257C-B0BF-4458-BCB4-AD4358D12A42}" type="datetimeFigureOut">
               <a:rPr lang="ko-KR" altLang="en-US" smtClean="0"/>
-              <a:t>2025-04-01</a:t>
+              <a:t>2025-04-02</a:t>
             </a:fld>
             <a:endParaRPr lang="ko-KR" altLang="en-US"/>
           </a:p>
@@ -2386,7 +2390,7 @@
           <a:p>
             <a:fld id="{9E8C257C-B0BF-4458-BCB4-AD4358D12A42}" type="datetimeFigureOut">
               <a:rPr lang="ko-KR" altLang="en-US" smtClean="0"/>
-              <a:t>2025-04-01</a:t>
+              <a:t>2025-04-02</a:t>
             </a:fld>
             <a:endParaRPr lang="ko-KR" altLang="en-US"/>
           </a:p>
@@ -2674,7 +2678,7 @@
           <a:p>
             <a:fld id="{9E8C257C-B0BF-4458-BCB4-AD4358D12A42}" type="datetimeFigureOut">
               <a:rPr lang="ko-KR" altLang="en-US" smtClean="0"/>
-              <a:t>2025-04-01</a:t>
+              <a:t>2025-04-02</a:t>
             </a:fld>
             <a:endParaRPr lang="ko-KR" altLang="en-US"/>
           </a:p>
@@ -2915,7 +2919,7 @@
           <a:p>
             <a:fld id="{9E8C257C-B0BF-4458-BCB4-AD4358D12A42}" type="datetimeFigureOut">
               <a:rPr lang="ko-KR" altLang="en-US" smtClean="0"/>
-              <a:t>2025-04-01</a:t>
+              <a:t>2025-04-02</a:t>
             </a:fld>
             <a:endParaRPr lang="ko-KR" altLang="en-US"/>
           </a:p>
@@ -3375,6 +3379,138 @@
 </p:sld>
 </file>
 
+<file path=ppt/slides/slide10.xml><?xml version="1.0" encoding="utf-8"?>
+<p:sld xmlns:a="http://schemas.openxmlformats.org/drawingml/2006/main" xmlns:r="http://schemas.openxmlformats.org/officeDocument/2006/relationships" xmlns:p="http://schemas.openxmlformats.org/presentationml/2006/main">
+  <p:cSld>
+    <p:spTree>
+      <p:nvGrpSpPr>
+        <p:cNvPr id="1" name="">
+          <a:extLst>
+            <a:ext uri="{FF2B5EF4-FFF2-40B4-BE49-F238E27FC236}">
+              <a16:creationId xmlns:a16="http://schemas.microsoft.com/office/drawing/2014/main" id="{0E0A73E4-EFC3-38B3-2E26-9EE1ECAF0BD3}"/>
+            </a:ext>
+          </a:extLst>
+        </p:cNvPr>
+        <p:cNvGrpSpPr/>
+        <p:nvPr/>
+      </p:nvGrpSpPr>
+      <p:grpSpPr>
+        <a:xfrm>
+          <a:off x="0" y="0"/>
+          <a:ext cx="0" cy="0"/>
+          <a:chOff x="0" y="0"/>
+          <a:chExt cx="0" cy="0"/>
+        </a:xfrm>
+      </p:grpSpPr>
+      <p:pic>
+        <p:nvPicPr>
+          <p:cNvPr id="3" name="그림 2">
+            <a:extLst>
+              <a:ext uri="{FF2B5EF4-FFF2-40B4-BE49-F238E27FC236}">
+                <a16:creationId xmlns:a16="http://schemas.microsoft.com/office/drawing/2014/main" id="{7CCA10D4-D2CA-6BA1-BB1C-2FAE542FAA14}"/>
+              </a:ext>
+            </a:extLst>
+          </p:cNvPr>
+          <p:cNvPicPr>
+            <a:picLocks noChangeAspect="1"/>
+          </p:cNvPicPr>
+          <p:nvPr/>
+        </p:nvPicPr>
+        <p:blipFill>
+          <a:blip r:embed="rId2"/>
+          <a:stretch>
+            <a:fillRect/>
+          </a:stretch>
+        </p:blipFill>
+        <p:spPr>
+          <a:xfrm>
+            <a:off x="0" y="16892"/>
+            <a:ext cx="12192000" cy="6824216"/>
+          </a:xfrm>
+          <a:prstGeom prst="rect">
+            <a:avLst/>
+          </a:prstGeom>
+        </p:spPr>
+      </p:pic>
+    </p:spTree>
+    <p:extLst>
+      <p:ext uri="{BB962C8B-B14F-4D97-AF65-F5344CB8AC3E}">
+        <p14:creationId xmlns:p14="http://schemas.microsoft.com/office/powerpoint/2010/main" val="1446451433"/>
+      </p:ext>
+    </p:extLst>
+  </p:cSld>
+  <p:clrMapOvr>
+    <a:masterClrMapping/>
+  </p:clrMapOvr>
+</p:sld>
+</file>
+
+<file path=ppt/slides/slide11.xml><?xml version="1.0" encoding="utf-8"?>
+<p:sld xmlns:a="http://schemas.openxmlformats.org/drawingml/2006/main" xmlns:r="http://schemas.openxmlformats.org/officeDocument/2006/relationships" xmlns:p="http://schemas.openxmlformats.org/presentationml/2006/main">
+  <p:cSld>
+    <p:spTree>
+      <p:nvGrpSpPr>
+        <p:cNvPr id="1" name="">
+          <a:extLst>
+            <a:ext uri="{FF2B5EF4-FFF2-40B4-BE49-F238E27FC236}">
+              <a16:creationId xmlns:a16="http://schemas.microsoft.com/office/drawing/2014/main" id="{A9861976-A40E-FA22-6120-BEFCBE20BC48}"/>
+            </a:ext>
+          </a:extLst>
+        </p:cNvPr>
+        <p:cNvGrpSpPr/>
+        <p:nvPr/>
+      </p:nvGrpSpPr>
+      <p:grpSpPr>
+        <a:xfrm>
+          <a:off x="0" y="0"/>
+          <a:ext cx="0" cy="0"/>
+          <a:chOff x="0" y="0"/>
+          <a:chExt cx="0" cy="0"/>
+        </a:xfrm>
+      </p:grpSpPr>
+      <p:pic>
+        <p:nvPicPr>
+          <p:cNvPr id="3" name="그림 2">
+            <a:extLst>
+              <a:ext uri="{FF2B5EF4-FFF2-40B4-BE49-F238E27FC236}">
+                <a16:creationId xmlns:a16="http://schemas.microsoft.com/office/drawing/2014/main" id="{FC8F195E-3371-29F5-9385-C26D126BD552}"/>
+              </a:ext>
+            </a:extLst>
+          </p:cNvPr>
+          <p:cNvPicPr>
+            <a:picLocks noChangeAspect="1"/>
+          </p:cNvPicPr>
+          <p:nvPr/>
+        </p:nvPicPr>
+        <p:blipFill>
+          <a:blip r:embed="rId2"/>
+          <a:stretch>
+            <a:fillRect/>
+          </a:stretch>
+        </p:blipFill>
+        <p:spPr>
+          <a:xfrm>
+            <a:off x="0" y="11488"/>
+            <a:ext cx="12192000" cy="6835023"/>
+          </a:xfrm>
+          <a:prstGeom prst="rect">
+            <a:avLst/>
+          </a:prstGeom>
+        </p:spPr>
+      </p:pic>
+    </p:spTree>
+    <p:extLst>
+      <p:ext uri="{BB962C8B-B14F-4D97-AF65-F5344CB8AC3E}">
+        <p14:creationId xmlns:p14="http://schemas.microsoft.com/office/powerpoint/2010/main" val="263867493"/>
+      </p:ext>
+    </p:extLst>
+  </p:cSld>
+  <p:clrMapOvr>
+    <a:masterClrMapping/>
+  </p:clrMapOvr>
+</p:sld>
+</file>
+
 <file path=ppt/slides/slide2.xml><?xml version="1.0" encoding="utf-8"?>
 <p:sld xmlns:a="http://schemas.openxmlformats.org/drawingml/2006/main" xmlns:r="http://schemas.openxmlformats.org/officeDocument/2006/relationships" xmlns:p="http://schemas.openxmlformats.org/presentationml/2006/main">
   <p:cSld>
@@ -3762,6 +3898,138 @@
     <p:extLst>
       <p:ext uri="{BB962C8B-B14F-4D97-AF65-F5344CB8AC3E}">
         <p14:creationId xmlns:p14="http://schemas.microsoft.com/office/powerpoint/2010/main" val="3830573088"/>
+      </p:ext>
+    </p:extLst>
+  </p:cSld>
+  <p:clrMapOvr>
+    <a:masterClrMapping/>
+  </p:clrMapOvr>
+</p:sld>
+</file>
+
+<file path=ppt/slides/slide8.xml><?xml version="1.0" encoding="utf-8"?>
+<p:sld xmlns:a="http://schemas.openxmlformats.org/drawingml/2006/main" xmlns:r="http://schemas.openxmlformats.org/officeDocument/2006/relationships" xmlns:p="http://schemas.openxmlformats.org/presentationml/2006/main">
+  <p:cSld>
+    <p:spTree>
+      <p:nvGrpSpPr>
+        <p:cNvPr id="1" name="">
+          <a:extLst>
+            <a:ext uri="{FF2B5EF4-FFF2-40B4-BE49-F238E27FC236}">
+              <a16:creationId xmlns:a16="http://schemas.microsoft.com/office/drawing/2014/main" id="{8A7F71FC-D6B8-DC7D-A0C0-4E5126E9B416}"/>
+            </a:ext>
+          </a:extLst>
+        </p:cNvPr>
+        <p:cNvGrpSpPr/>
+        <p:nvPr/>
+      </p:nvGrpSpPr>
+      <p:grpSpPr>
+        <a:xfrm>
+          <a:off x="0" y="0"/>
+          <a:ext cx="0" cy="0"/>
+          <a:chOff x="0" y="0"/>
+          <a:chExt cx="0" cy="0"/>
+        </a:xfrm>
+      </p:grpSpPr>
+      <p:pic>
+        <p:nvPicPr>
+          <p:cNvPr id="3" name="그림 2">
+            <a:extLst>
+              <a:ext uri="{FF2B5EF4-FFF2-40B4-BE49-F238E27FC236}">
+                <a16:creationId xmlns:a16="http://schemas.microsoft.com/office/drawing/2014/main" id="{4EFDC971-0B90-E180-E677-3B832F8F8AF0}"/>
+              </a:ext>
+            </a:extLst>
+          </p:cNvPr>
+          <p:cNvPicPr>
+            <a:picLocks noChangeAspect="1"/>
+          </p:cNvPicPr>
+          <p:nvPr/>
+        </p:nvPicPr>
+        <p:blipFill>
+          <a:blip r:embed="rId2"/>
+          <a:stretch>
+            <a:fillRect/>
+          </a:stretch>
+        </p:blipFill>
+        <p:spPr>
+          <a:xfrm>
+            <a:off x="0" y="29380"/>
+            <a:ext cx="12192000" cy="6799240"/>
+          </a:xfrm>
+          <a:prstGeom prst="rect">
+            <a:avLst/>
+          </a:prstGeom>
+        </p:spPr>
+      </p:pic>
+    </p:spTree>
+    <p:extLst>
+      <p:ext uri="{BB962C8B-B14F-4D97-AF65-F5344CB8AC3E}">
+        <p14:creationId xmlns:p14="http://schemas.microsoft.com/office/powerpoint/2010/main" val="2865918300"/>
+      </p:ext>
+    </p:extLst>
+  </p:cSld>
+  <p:clrMapOvr>
+    <a:masterClrMapping/>
+  </p:clrMapOvr>
+</p:sld>
+</file>
+
+<file path=ppt/slides/slide9.xml><?xml version="1.0" encoding="utf-8"?>
+<p:sld xmlns:a="http://schemas.openxmlformats.org/drawingml/2006/main" xmlns:r="http://schemas.openxmlformats.org/officeDocument/2006/relationships" xmlns:p="http://schemas.openxmlformats.org/presentationml/2006/main">
+  <p:cSld>
+    <p:spTree>
+      <p:nvGrpSpPr>
+        <p:cNvPr id="1" name="">
+          <a:extLst>
+            <a:ext uri="{FF2B5EF4-FFF2-40B4-BE49-F238E27FC236}">
+              <a16:creationId xmlns:a16="http://schemas.microsoft.com/office/drawing/2014/main" id="{6916A904-C75C-33C6-5FF4-8321FD639DE1}"/>
+            </a:ext>
+          </a:extLst>
+        </p:cNvPr>
+        <p:cNvGrpSpPr/>
+        <p:nvPr/>
+      </p:nvGrpSpPr>
+      <p:grpSpPr>
+        <a:xfrm>
+          <a:off x="0" y="0"/>
+          <a:ext cx="0" cy="0"/>
+          <a:chOff x="0" y="0"/>
+          <a:chExt cx="0" cy="0"/>
+        </a:xfrm>
+      </p:grpSpPr>
+      <p:pic>
+        <p:nvPicPr>
+          <p:cNvPr id="3" name="그림 2">
+            <a:extLst>
+              <a:ext uri="{FF2B5EF4-FFF2-40B4-BE49-F238E27FC236}">
+                <a16:creationId xmlns:a16="http://schemas.microsoft.com/office/drawing/2014/main" id="{9A4B2C83-B031-0379-3BEC-2D2A62584F09}"/>
+              </a:ext>
+            </a:extLst>
+          </p:cNvPr>
+          <p:cNvPicPr>
+            <a:picLocks noChangeAspect="1"/>
+          </p:cNvPicPr>
+          <p:nvPr/>
+        </p:nvPicPr>
+        <p:blipFill>
+          <a:blip r:embed="rId2"/>
+          <a:stretch>
+            <a:fillRect/>
+          </a:stretch>
+        </p:blipFill>
+        <p:spPr>
+          <a:xfrm>
+            <a:off x="0" y="25275"/>
+            <a:ext cx="12192000" cy="6807449"/>
+          </a:xfrm>
+          <a:prstGeom prst="rect">
+            <a:avLst/>
+          </a:prstGeom>
+        </p:spPr>
+      </p:pic>
+    </p:spTree>
+    <p:extLst>
+      <p:ext uri="{BB962C8B-B14F-4D97-AF65-F5344CB8AC3E}">
+        <p14:creationId xmlns:p14="http://schemas.microsoft.com/office/powerpoint/2010/main" val="89541112"/>
       </p:ext>
     </p:extLst>
   </p:cSld>

</xml_diff>